<commit_message>
Edited PPT, small fix of client page
</commit_message>
<xml_diff>
--- a/Final Project Presentation.pptx
+++ b/Final Project Presentation.pptx
@@ -125,7 +125,7 @@
 <p1510:revInfo xmlns:a="http://schemas.openxmlformats.org/drawingml/2006/main" xmlns:r="http://schemas.openxmlformats.org/officeDocument/2006/relationships" xmlns:p1510="http://schemas.microsoft.com/office/powerpoint/2015/10/main">
   <p1510:revLst>
     <p1510:client id="{284D37D1-4614-432B-9137-1CBE49B2EEBF}" v="61" dt="2024-04-18T19:55:41.345"/>
-    <p1510:client id="{EE088E7D-F8A1-447A-96DC-31A0949ED3AE}" v="1" dt="2024-04-18T20:20:05.470"/>
+    <p1510:client id="{EE088E7D-F8A1-447A-96DC-31A0949ED3AE}" v="95" dt="2024-04-18T21:07:01.516"/>
   </p1510:revLst>
 </p1510:revInfo>
 </file>
@@ -2187,10 +2187,103 @@
   <pc:docChgLst>
     <pc:chgData name="浩宇 王" userId="9777b43a9e96ea5f" providerId="LiveId" clId="{EE088E7D-F8A1-447A-96DC-31A0949ED3AE}"/>
     <pc:docChg chg="undo custSel modSld">
-      <pc:chgData name="浩宇 王" userId="9777b43a9e96ea5f" providerId="LiveId" clId="{EE088E7D-F8A1-447A-96DC-31A0949ED3AE}" dt="2024-04-18T20:40:24.034" v="238" actId="20577"/>
+      <pc:chgData name="浩宇 王" userId="9777b43a9e96ea5f" providerId="LiveId" clId="{EE088E7D-F8A1-447A-96DC-31A0949ED3AE}" dt="2024-04-18T21:14:44.573" v="633" actId="729"/>
       <pc:docMkLst>
         <pc:docMk/>
       </pc:docMkLst>
+      <pc:sldChg chg="addSp modSp mod modAnim modNotesTx">
+        <pc:chgData name="浩宇 王" userId="9777b43a9e96ea5f" providerId="LiveId" clId="{EE088E7D-F8A1-447A-96DC-31A0949ED3AE}" dt="2024-04-18T21:11:37.707" v="509" actId="20577"/>
+        <pc:sldMkLst>
+          <pc:docMk/>
+          <pc:sldMk cId="4116934915" sldId="256"/>
+        </pc:sldMkLst>
+        <pc:spChg chg="add mod">
+          <ac:chgData name="浩宇 王" userId="9777b43a9e96ea5f" providerId="LiveId" clId="{EE088E7D-F8A1-447A-96DC-31A0949ED3AE}" dt="2024-04-18T21:01:00.107" v="289"/>
+          <ac:spMkLst>
+            <pc:docMk/>
+            <pc:sldMk cId="4116934915" sldId="256"/>
+            <ac:spMk id="2" creationId="{4E11BDCD-A811-9628-6706-F3EFA1E7931D}"/>
+          </ac:spMkLst>
+        </pc:spChg>
+        <pc:spChg chg="mod">
+          <ac:chgData name="浩宇 王" userId="9777b43a9e96ea5f" providerId="LiveId" clId="{EE088E7D-F8A1-447A-96DC-31A0949ED3AE}" dt="2024-04-18T20:59:48.490" v="259" actId="1076"/>
+          <ac:spMkLst>
+            <pc:docMk/>
+            <pc:sldMk cId="4116934915" sldId="256"/>
+            <ac:spMk id="23" creationId="{00000000-0000-0000-0000-000000000000}"/>
+          </ac:spMkLst>
+        </pc:spChg>
+      </pc:sldChg>
+      <pc:sldChg chg="modSp mod modNotesTx">
+        <pc:chgData name="浩宇 王" userId="9777b43a9e96ea5f" providerId="LiveId" clId="{EE088E7D-F8A1-447A-96DC-31A0949ED3AE}" dt="2024-04-18T21:13:29.984" v="631" actId="20577"/>
+        <pc:sldMkLst>
+          <pc:docMk/>
+          <pc:sldMk cId="3177367785" sldId="257"/>
+        </pc:sldMkLst>
+        <pc:spChg chg="mod">
+          <ac:chgData name="浩宇 王" userId="9777b43a9e96ea5f" providerId="LiveId" clId="{EE088E7D-F8A1-447A-96DC-31A0949ED3AE}" dt="2024-04-18T21:01:36.936" v="291" actId="1076"/>
+          <ac:spMkLst>
+            <pc:docMk/>
+            <pc:sldMk cId="3177367785" sldId="257"/>
+            <ac:spMk id="25" creationId="{00000000-0000-0000-0000-000000000000}"/>
+          </ac:spMkLst>
+        </pc:spChg>
+        <pc:spChg chg="mod">
+          <ac:chgData name="浩宇 王" userId="9777b43a9e96ea5f" providerId="LiveId" clId="{EE088E7D-F8A1-447A-96DC-31A0949ED3AE}" dt="2024-04-18T21:01:43.199" v="292"/>
+          <ac:spMkLst>
+            <pc:docMk/>
+            <pc:sldMk cId="3177367785" sldId="257"/>
+            <ac:spMk id="26" creationId="{00000000-0000-0000-0000-000000000000}"/>
+          </ac:spMkLst>
+        </pc:spChg>
+        <pc:spChg chg="mod">
+          <ac:chgData name="浩宇 王" userId="9777b43a9e96ea5f" providerId="LiveId" clId="{EE088E7D-F8A1-447A-96DC-31A0949ED3AE}" dt="2024-04-18T21:05:27.575" v="303" actId="1076"/>
+          <ac:spMkLst>
+            <pc:docMk/>
+            <pc:sldMk cId="3177367785" sldId="257"/>
+            <ac:spMk id="27" creationId="{00000000-0000-0000-0000-000000000000}"/>
+          </ac:spMkLst>
+        </pc:spChg>
+        <pc:spChg chg="mod">
+          <ac:chgData name="浩宇 王" userId="9777b43a9e96ea5f" providerId="LiveId" clId="{EE088E7D-F8A1-447A-96DC-31A0949ED3AE}" dt="2024-04-18T21:05:37.052" v="316" actId="20577"/>
+          <ac:spMkLst>
+            <pc:docMk/>
+            <pc:sldMk cId="3177367785" sldId="257"/>
+            <ac:spMk id="28" creationId="{00000000-0000-0000-0000-000000000000}"/>
+          </ac:spMkLst>
+        </pc:spChg>
+      </pc:sldChg>
+      <pc:sldChg chg="modSp mod modAnim">
+        <pc:chgData name="浩宇 王" userId="9777b43a9e96ea5f" providerId="LiveId" clId="{EE088E7D-F8A1-447A-96DC-31A0949ED3AE}" dt="2024-04-18T21:07:01.515" v="340" actId="20577"/>
+        <pc:sldMkLst>
+          <pc:docMk/>
+          <pc:sldMk cId="1577986047" sldId="262"/>
+        </pc:sldMkLst>
+        <pc:spChg chg="mod">
+          <ac:chgData name="浩宇 王" userId="9777b43a9e96ea5f" providerId="LiveId" clId="{EE088E7D-F8A1-447A-96DC-31A0949ED3AE}" dt="2024-04-18T21:06:12.612" v="319" actId="207"/>
+          <ac:spMkLst>
+            <pc:docMk/>
+            <pc:sldMk cId="1577986047" sldId="262"/>
+            <ac:spMk id="3" creationId="{00000000-0000-0000-0000-000000000000}"/>
+          </ac:spMkLst>
+        </pc:spChg>
+        <pc:spChg chg="mod">
+          <ac:chgData name="浩宇 王" userId="9777b43a9e96ea5f" providerId="LiveId" clId="{EE088E7D-F8A1-447A-96DC-31A0949ED3AE}" dt="2024-04-18T21:06:06.818" v="318" actId="207"/>
+          <ac:spMkLst>
+            <pc:docMk/>
+            <pc:sldMk cId="1577986047" sldId="262"/>
+            <ac:spMk id="4" creationId="{00000000-0000-0000-0000-000000000000}"/>
+          </ac:spMkLst>
+        </pc:spChg>
+        <pc:spChg chg="mod">
+          <ac:chgData name="浩宇 王" userId="9777b43a9e96ea5f" providerId="LiveId" clId="{EE088E7D-F8A1-447A-96DC-31A0949ED3AE}" dt="2024-04-18T21:07:01.515" v="340" actId="20577"/>
+          <ac:spMkLst>
+            <pc:docMk/>
+            <pc:sldMk cId="1577986047" sldId="262"/>
+            <ac:spMk id="24" creationId="{00000000-0000-0000-0000-000000000000}"/>
+          </ac:spMkLst>
+        </pc:spChg>
+      </pc:sldChg>
       <pc:sldChg chg="addSp delSp mod modNotesTx">
         <pc:chgData name="浩宇 王" userId="9777b43a9e96ea5f" providerId="LiveId" clId="{EE088E7D-F8A1-447A-96DC-31A0949ED3AE}" dt="2024-04-18T20:14:06.423" v="67" actId="20577"/>
         <pc:sldMkLst>
@@ -2205,6 +2298,13 @@
             <ac:spMk id="21" creationId="{8853C185-DE5B-191E-3851-3C2D520DC29D}"/>
           </ac:spMkLst>
         </pc:spChg>
+      </pc:sldChg>
+      <pc:sldChg chg="mod modShow modNotesTx">
+        <pc:chgData name="浩宇 王" userId="9777b43a9e96ea5f" providerId="LiveId" clId="{EE088E7D-F8A1-447A-96DC-31A0949ED3AE}" dt="2024-04-18T21:14:44.573" v="633" actId="729"/>
+        <pc:sldMkLst>
+          <pc:docMk/>
+          <pc:sldMk cId="2144335030" sldId="300"/>
+        </pc:sldMkLst>
       </pc:sldChg>
       <pc:sldChg chg="addSp delSp mod modNotesTx">
         <pc:chgData name="浩宇 王" userId="9777b43a9e96ea5f" providerId="LiveId" clId="{EE088E7D-F8A1-447A-96DC-31A0949ED3AE}" dt="2024-04-18T20:40:24.034" v="238" actId="20577"/>
@@ -3342,7 +3442,125 @@
           <a:bodyPr/>
           <a:lstStyle/>
           <a:p>
-            <a:endParaRPr lang="zh-CN" altLang="en-US" dirty="0"/>
+            <a:r>
+              <a:rPr lang="en-US" altLang="zh-CN" dirty="0"/>
+              <a:t>Hello, this is the description of our final project for the Course </a:t>
+            </a:r>
+            <a:r>
+              <a:rPr lang="en-US" altLang="zh-CN" sz="1200" dirty="0"/>
+              <a:t>Database Management Systems – an online takeaway ordering system</a:t>
+            </a:r>
+            <a:r>
+              <a:rPr lang="zh-CN" altLang="en-US" sz="1200" dirty="0"/>
+              <a:t>：</a:t>
+            </a:r>
+            <a:endParaRPr lang="en-US" altLang="zh-CN" sz="1200" dirty="0"/>
+          </a:p>
+          <a:p>
+            <a:r>
+              <a:rPr lang="en-US" altLang="zh-CN" sz="1200" b="1" kern="100" dirty="0">
+                <a:solidFill>
+                  <a:schemeClr val="tx1">
+                    <a:lumMod val="75000"/>
+                    <a:lumOff val="25000"/>
+                  </a:schemeClr>
+                </a:solidFill>
+                <a:latin typeface="微软雅黑" panose="020B0503020204020204" pitchFamily="34" charset="-122"/>
+                <a:ea typeface="微软雅黑" panose="020B0503020204020204" pitchFamily="34" charset="-122"/>
+                <a:cs typeface="Times New Roman" panose="02020603050405020304" pitchFamily="18" charset="0"/>
+              </a:rPr>
+              <a:t>Tiger Takeaway</a:t>
+            </a:r>
+            <a:endParaRPr lang="zh-CN" altLang="zh-CN" sz="900" b="1" kern="100" dirty="0">
+              <a:solidFill>
+                <a:schemeClr val="tx1">
+                  <a:lumMod val="75000"/>
+                  <a:lumOff val="25000"/>
+                </a:schemeClr>
+              </a:solidFill>
+              <a:latin typeface="微软雅黑" panose="020B0503020204020204" pitchFamily="34" charset="-122"/>
+              <a:ea typeface="微软雅黑" panose="020B0503020204020204" pitchFamily="34" charset="-122"/>
+              <a:cs typeface="Times New Roman" panose="02020603050405020304" pitchFamily="18" charset="0"/>
+            </a:endParaRPr>
+          </a:p>
+          <a:p>
+            <a:r>
+              <a:rPr lang="en-US" altLang="zh-CN" sz="1200" dirty="0"/>
+              <a:t> My name is Haoyu Wang in Group </a:t>
+            </a:r>
+            <a:r>
+              <a:rPr lang="en-US" altLang="zh-CN" sz="1200" b="0" dirty="0" err="1">
+                <a:solidFill>
+                  <a:schemeClr val="tx1">
+                    <a:lumMod val="50000"/>
+                    <a:lumOff val="50000"/>
+                  </a:schemeClr>
+                </a:solidFill>
+                <a:cs typeface="Arial" panose="020B0604020202020204" pitchFamily="34" charset="0"/>
+              </a:rPr>
+              <a:t>WangHYeCLiJ</a:t>
+            </a:r>
+            <a:r>
+              <a:rPr lang="en-US" altLang="zh-CN" sz="1200" b="0" dirty="0">
+                <a:solidFill>
+                  <a:schemeClr val="tx1">
+                    <a:lumMod val="50000"/>
+                    <a:lumOff val="50000"/>
+                  </a:schemeClr>
+                </a:solidFill>
+                <a:cs typeface="Arial" panose="020B0604020202020204" pitchFamily="34" charset="0"/>
+              </a:rPr>
+              <a:t>, the other two members are </a:t>
+            </a:r>
+            <a:r>
+              <a:rPr lang="en-US" altLang="zh-CN" sz="1200" b="0" dirty="0" err="1">
+                <a:solidFill>
+                  <a:schemeClr val="tx1">
+                    <a:lumMod val="50000"/>
+                    <a:lumOff val="50000"/>
+                  </a:schemeClr>
+                </a:solidFill>
+                <a:cs typeface="Arial" panose="020B0604020202020204" pitchFamily="34" charset="0"/>
+              </a:rPr>
+              <a:t>Chunzhao</a:t>
+            </a:r>
+            <a:r>
+              <a:rPr lang="en-US" altLang="zh-CN" sz="1200" b="0" dirty="0">
+                <a:solidFill>
+                  <a:schemeClr val="tx1">
+                    <a:lumMod val="50000"/>
+                    <a:lumOff val="50000"/>
+                  </a:schemeClr>
+                </a:solidFill>
+                <a:cs typeface="Arial" panose="020B0604020202020204" pitchFamily="34" charset="0"/>
+              </a:rPr>
+              <a:t> Ye and </a:t>
+            </a:r>
+            <a:r>
+              <a:rPr lang="en-US" altLang="zh-CN" sz="1200" b="0" dirty="0" err="1">
+                <a:solidFill>
+                  <a:schemeClr val="tx1">
+                    <a:lumMod val="50000"/>
+                    <a:lumOff val="50000"/>
+                  </a:schemeClr>
+                </a:solidFill>
+                <a:cs typeface="Arial" panose="020B0604020202020204" pitchFamily="34" charset="0"/>
+              </a:rPr>
+              <a:t>Jinbo</a:t>
+            </a:r>
+            <a:r>
+              <a:rPr lang="en-US" altLang="zh-CN" sz="1200" b="0" dirty="0">
+                <a:solidFill>
+                  <a:schemeClr val="tx1">
+                    <a:lumMod val="50000"/>
+                    <a:lumOff val="50000"/>
+                  </a:schemeClr>
+                </a:solidFill>
+                <a:cs typeface="Arial" panose="020B0604020202020204" pitchFamily="34" charset="0"/>
+              </a:rPr>
+              <a:t> Li.</a:t>
+            </a:r>
+            <a:endParaRPr lang="zh-CN" altLang="en-US" b="0" dirty="0"/>
           </a:p>
         </p:txBody>
       </p:sp>
@@ -3426,10 +3644,71 @@
           <a:bodyPr/>
           <a:lstStyle/>
           <a:p>
+            <a:pPr marL="0" marR="0" lvl="0" indent="0" algn="l" defTabSz="914400" rtl="0" eaLnBrk="1" fontAlgn="auto" latinLnBrk="0" hangingPunct="1">
+              <a:lnSpc>
+                <a:spcPct val="100000"/>
+              </a:lnSpc>
+              <a:spcBef>
+                <a:spcPts val="0"/>
+              </a:spcBef>
+              <a:spcAft>
+                <a:spcPts val="0"/>
+              </a:spcAft>
+              <a:buClrTx/>
+              <a:buSzTx/>
+              <a:buFontTx/>
+              <a:buNone/>
+              <a:tabLst/>
+              <a:defRPr/>
+            </a:pPr>
             <a:r>
               <a:rPr lang="en-US" altLang="zh-CN" dirty="0"/>
-              <a:t>Our business flow is shown in this slide: First, we need a back-end server to provide persistence services for the front-end. The front-end uses web pages to provide interfaces, so the front-end and back-end need to communicate through the REST API. Secondly, we need a database to store and modify the data we generate in our business, and the server also needs to be able to operate the database. The front end is divided into two scenarios: the backstage and the client. And the backstage contains two roles: managers and employees; the client only has the user role.</a:t>
+              <a:t>I’ll first describe the business flow and </a:t>
             </a:r>
+            <a:r>
+              <a:rPr lang="en-US" altLang="zh-CN" sz="1200" b="0" dirty="0">
+                <a:solidFill>
+                  <a:schemeClr val="tx1">
+                    <a:lumMod val="75000"/>
+                    <a:lumOff val="25000"/>
+                  </a:schemeClr>
+                </a:solidFill>
+                <a:latin typeface="微软雅黑" panose="020B0503020204020204" pitchFamily="34" charset="-122"/>
+                <a:ea typeface="微软雅黑" panose="020B0503020204020204" pitchFamily="34" charset="-122"/>
+                <a:cs typeface="Times New Roman" panose="02020603050405020304" pitchFamily="18" charset="0"/>
+              </a:rPr>
+              <a:t>Specifications &amp; Architecture, then the other group members will </a:t>
+            </a:r>
+            <a:r>
+              <a:rPr lang="en-US" altLang="zh-CN" dirty="0"/>
+              <a:t>show the </a:t>
+            </a:r>
+            <a:r>
+              <a:rPr lang="en-US" altLang="zh-CN" sz="1200" b="0" dirty="0">
+                <a:solidFill>
+                  <a:schemeClr val="tx1">
+                    <a:lumMod val="75000"/>
+                    <a:lumOff val="25000"/>
+                  </a:schemeClr>
+                </a:solidFill>
+                <a:latin typeface="微软雅黑" panose="020B0503020204020204" pitchFamily="34" charset="-122"/>
+                <a:ea typeface="微软雅黑" panose="020B0503020204020204" pitchFamily="34" charset="-122"/>
+                <a:cs typeface="Times New Roman" panose="02020603050405020304" pitchFamily="18" charset="0"/>
+              </a:rPr>
+              <a:t>Backstage and the client.</a:t>
+            </a:r>
+            <a:endParaRPr lang="zh-CN" altLang="en-US" sz="1200" b="0" dirty="0">
+              <a:solidFill>
+                <a:schemeClr val="tx1">
+                  <a:lumMod val="75000"/>
+                  <a:lumOff val="25000"/>
+                </a:schemeClr>
+              </a:solidFill>
+              <a:latin typeface="微软雅黑" panose="020B0503020204020204" pitchFamily="34" charset="-122"/>
+              <a:ea typeface="微软雅黑" panose="020B0503020204020204" pitchFamily="34" charset="-122"/>
+            </a:endParaRPr>
+          </a:p>
+          <a:p>
             <a:endParaRPr lang="zh-CN" altLang="en-US" dirty="0"/>
           </a:p>
         </p:txBody>
@@ -3451,7 +3730,7 @@
           <a:p>
             <a:fld id="{5B0BB924-28C1-4EF7-A019-613D541E4AA8}" type="slidenum">
               <a:rPr lang="zh-CN" altLang="en-US" smtClean="0"/>
-              <a:t>3</a:t>
+              <a:t>2</a:t>
             </a:fld>
             <a:endParaRPr lang="zh-CN" altLang="en-US"/>
           </a:p>
@@ -3460,7 +3739,7 @@
     </p:spTree>
     <p:extLst>
       <p:ext uri="{BB962C8B-B14F-4D97-AF65-F5344CB8AC3E}">
-        <p14:creationId xmlns:p14="http://schemas.microsoft.com/office/powerpoint/2010/main" val="2734000010"/>
+        <p14:creationId xmlns:p14="http://schemas.microsoft.com/office/powerpoint/2010/main" val="3781094357"/>
       </p:ext>
     </p:extLst>
   </p:cSld>
@@ -3516,67 +3795,9 @@
           <a:p>
             <a:r>
               <a:rPr lang="en-US" altLang="zh-CN" dirty="0"/>
-              <a:t>We used the technologies shown in this slide based on our business flow, combined with the content learned in the course and the experience accumulated by the team members from previous studies and internships.</a:t>
+              <a:t>Our business flow is shown in this slide: First, we need a back-end server to provide persistence services for the front-end. The front-end uses web pages to provide interfaces, so the front-end and back-end need to communicate through the REST API. Secondly, we need a database to store and modify the data we generate in our business, and the server also needs to be able to operate the database. The front end is divided into two scenarios: the backstage and the client. And the backstage contains two roles: managers and employees; the client only has the user role.</a:t>
             </a:r>
-          </a:p>
-          <a:p>
-            <a:endParaRPr lang="en-US" altLang="zh-CN" dirty="0"/>
-          </a:p>
-          <a:p>
-            <a:r>
-              <a:rPr lang="en-US" altLang="zh-CN" dirty="0"/>
-              <a:t>Spring Boot is a set of packages that can be used out of the box, based on the famous Java Spring MVC. It can efficiently build a complete back-end service application with uncomplicated configurations and codes. Most of the team members in our team have Java development experience, including Spring Boot internship experience, so there was no debate on choosing this framework. </a:t>
-            </a:r>
-          </a:p>
-          <a:p>
-            <a:endParaRPr lang="en-US" altLang="zh-CN" dirty="0"/>
-          </a:p>
-          <a:p>
-            <a:r>
-              <a:rPr lang="en-US" altLang="zh-CN" dirty="0"/>
-              <a:t>We have come across </a:t>
-            </a:r>
-            <a:r>
-              <a:rPr lang="en-US" altLang="zh-CN" dirty="0" err="1"/>
-              <a:t>Mybatis</a:t>
-            </a:r>
-            <a:r>
-              <a:rPr lang="en-US" altLang="zh-CN" dirty="0"/>
-              <a:t> in previous experiences. </a:t>
-            </a:r>
-            <a:r>
-              <a:rPr lang="en-US" altLang="zh-CN" dirty="0" err="1"/>
-              <a:t>Mybatis</a:t>
-            </a:r>
-            <a:r>
-              <a:rPr lang="en-US" altLang="zh-CN" dirty="0"/>
-              <a:t> is an Object Relational Mapping framework that can serve as a bridge to connect data in relational databases and merge them into objects in object-oriented programming languages, such as Java. For the database, we chose MySQL.</a:t>
-            </a:r>
-          </a:p>
-          <a:p>
-            <a:endParaRPr lang="en-US" altLang="zh-CN" dirty="0"/>
-          </a:p>
-          <a:p>
-            <a:r>
-              <a:rPr lang="en-US" altLang="zh-CN" dirty="0"/>
-              <a:t>For the front-end page, we used the Vue.js framework and some templates to make it. Vue is a JavaScript/TypeScript progressive framework for building web applications. Our web pages will run </a:t>
-            </a:r>
-            <a:r>
-              <a:rPr lang="en-US" altLang="zh-CN"/>
-              <a:t>and be tested on </a:t>
-            </a:r>
-            <a:r>
-              <a:rPr lang="en-US" altLang="zh-CN" dirty="0"/>
-              <a:t>Google Chrome on PC, </a:t>
-            </a:r>
-            <a:r>
-              <a:rPr lang="en-US" altLang="zh-CN" dirty="0" err="1"/>
-              <a:t>ios</a:t>
-            </a:r>
-            <a:r>
-              <a:rPr lang="en-US" altLang="zh-CN" dirty="0"/>
-              <a:t> Safari on mobile, and Chrome resized for mobile layout.</a:t>
-            </a:r>
+            <a:endParaRPr lang="zh-CN" altLang="en-US" dirty="0"/>
           </a:p>
         </p:txBody>
       </p:sp>
@@ -3597,7 +3818,7 @@
           <a:p>
             <a:fld id="{5B0BB924-28C1-4EF7-A019-613D541E4AA8}" type="slidenum">
               <a:rPr lang="zh-CN" altLang="en-US" smtClean="0"/>
-              <a:t>4</a:t>
+              <a:t>3</a:t>
             </a:fld>
             <a:endParaRPr lang="zh-CN" altLang="en-US"/>
           </a:p>
@@ -3606,7 +3827,7 @@
     </p:spTree>
     <p:extLst>
       <p:ext uri="{BB962C8B-B14F-4D97-AF65-F5344CB8AC3E}">
-        <p14:creationId xmlns:p14="http://schemas.microsoft.com/office/powerpoint/2010/main" val="4205250633"/>
+        <p14:creationId xmlns:p14="http://schemas.microsoft.com/office/powerpoint/2010/main" val="2734000010"/>
       </p:ext>
     </p:extLst>
   </p:cSld>
@@ -3660,6 +3881,156 @@
           <a:bodyPr/>
           <a:lstStyle/>
           <a:p>
+            <a:r>
+              <a:rPr lang="en-US" altLang="zh-CN" dirty="0"/>
+              <a:t>We used the technologies shown in this slide based on our business flow, combined with the content learned in the course and the experience accumulated by the team members from previous studies and internships.</a:t>
+            </a:r>
+          </a:p>
+          <a:p>
+            <a:endParaRPr lang="en-US" altLang="zh-CN" dirty="0"/>
+          </a:p>
+          <a:p>
+            <a:r>
+              <a:rPr lang="en-US" altLang="zh-CN" dirty="0"/>
+              <a:t>Spring Boot is a set of packages that can be used out of the box, based on the famous Java Spring MVC. It can efficiently build a complete back-end service application with uncomplicated configurations and codes. Most of the team members in our team have Java development experience, including Spring Boot internship experience, so there was no debate on choosing this framework. </a:t>
+            </a:r>
+          </a:p>
+          <a:p>
+            <a:endParaRPr lang="en-US" altLang="zh-CN" dirty="0"/>
+          </a:p>
+          <a:p>
+            <a:r>
+              <a:rPr lang="en-US" altLang="zh-CN" dirty="0"/>
+              <a:t>We have come across </a:t>
+            </a:r>
+            <a:r>
+              <a:rPr lang="en-US" altLang="zh-CN" dirty="0" err="1"/>
+              <a:t>Mybatis</a:t>
+            </a:r>
+            <a:r>
+              <a:rPr lang="en-US" altLang="zh-CN" dirty="0"/>
+              <a:t> in previous experiences. </a:t>
+            </a:r>
+            <a:r>
+              <a:rPr lang="en-US" altLang="zh-CN" dirty="0" err="1"/>
+              <a:t>Mybatis</a:t>
+            </a:r>
+            <a:r>
+              <a:rPr lang="en-US" altLang="zh-CN" dirty="0"/>
+              <a:t> is an Object Relational Mapping framework that can serve as a bridge to connect data in relational databases and merge them into objects in object-oriented programming languages, such as Java. For the database, we chose MySQL.</a:t>
+            </a:r>
+          </a:p>
+          <a:p>
+            <a:endParaRPr lang="en-US" altLang="zh-CN" dirty="0"/>
+          </a:p>
+          <a:p>
+            <a:r>
+              <a:rPr lang="en-US" altLang="zh-CN" dirty="0"/>
+              <a:t>For the front-end page, we used the Vue.js framework and some templates to make it. Vue is a JavaScript/TypeScript progressive framework for building web applications. Our web pages will run </a:t>
+            </a:r>
+            <a:r>
+              <a:rPr lang="en-US" altLang="zh-CN"/>
+              <a:t>and be tested on </a:t>
+            </a:r>
+            <a:r>
+              <a:rPr lang="en-US" altLang="zh-CN" dirty="0"/>
+              <a:t>Google Chrome on PC, </a:t>
+            </a:r>
+            <a:r>
+              <a:rPr lang="en-US" altLang="zh-CN" dirty="0" err="1"/>
+              <a:t>ios</a:t>
+            </a:r>
+            <a:r>
+              <a:rPr lang="en-US" altLang="zh-CN" dirty="0"/>
+              <a:t> Safari on mobile, and Chrome resized for mobile layout.</a:t>
+            </a:r>
+          </a:p>
+        </p:txBody>
+      </p:sp>
+      <p:sp>
+        <p:nvSpPr>
+          <p:cNvPr id="4" name="灯片编号占位符 3"/>
+          <p:cNvSpPr>
+            <a:spLocks noGrp="1"/>
+          </p:cNvSpPr>
+          <p:nvPr>
+            <p:ph type="sldNum" sz="quarter" idx="5"/>
+          </p:nvPr>
+        </p:nvSpPr>
+        <p:spPr/>
+        <p:txBody>
+          <a:bodyPr/>
+          <a:lstStyle/>
+          <a:p>
+            <a:fld id="{5B0BB924-28C1-4EF7-A019-613D541E4AA8}" type="slidenum">
+              <a:rPr lang="zh-CN" altLang="en-US" smtClean="0"/>
+              <a:t>4</a:t>
+            </a:fld>
+            <a:endParaRPr lang="zh-CN" altLang="en-US"/>
+          </a:p>
+        </p:txBody>
+      </p:sp>
+    </p:spTree>
+    <p:extLst>
+      <p:ext uri="{BB962C8B-B14F-4D97-AF65-F5344CB8AC3E}">
+        <p14:creationId xmlns:p14="http://schemas.microsoft.com/office/powerpoint/2010/main" val="4205250633"/>
+      </p:ext>
+    </p:extLst>
+  </p:cSld>
+  <p:clrMapOvr>
+    <a:masterClrMapping/>
+  </p:clrMapOvr>
+</p:notes>
+</file>
+
+<file path=ppt/notesSlides/notesSlide5.xml><?xml version="1.0" encoding="utf-8"?>
+<p:notes xmlns:a="http://schemas.openxmlformats.org/drawingml/2006/main" xmlns:r="http://schemas.openxmlformats.org/officeDocument/2006/relationships" xmlns:p="http://schemas.openxmlformats.org/presentationml/2006/main">
+  <p:cSld>
+    <p:spTree>
+      <p:nvGrpSpPr>
+        <p:cNvPr id="1" name=""/>
+        <p:cNvGrpSpPr/>
+        <p:nvPr/>
+      </p:nvGrpSpPr>
+      <p:grpSpPr>
+        <a:xfrm>
+          <a:off x="0" y="0"/>
+          <a:ext cx="0" cy="0"/>
+          <a:chOff x="0" y="0"/>
+          <a:chExt cx="0" cy="0"/>
+        </a:xfrm>
+      </p:grpSpPr>
+      <p:sp>
+        <p:nvSpPr>
+          <p:cNvPr id="2" name="幻灯片图像占位符 1"/>
+          <p:cNvSpPr>
+            <a:spLocks noGrp="1" noRot="1" noChangeAspect="1"/>
+          </p:cNvSpPr>
+          <p:nvPr>
+            <p:ph type="sldImg"/>
+          </p:nvPr>
+        </p:nvSpPr>
+        <p:spPr/>
+      </p:sp>
+      <p:sp>
+        <p:nvSpPr>
+          <p:cNvPr id="3" name="备注占位符 2"/>
+          <p:cNvSpPr>
+            <a:spLocks noGrp="1"/>
+          </p:cNvSpPr>
+          <p:nvPr>
+            <p:ph type="body" idx="1"/>
+          </p:nvPr>
+        </p:nvSpPr>
+        <p:spPr/>
+        <p:txBody>
+          <a:bodyPr/>
+          <a:lstStyle/>
+          <a:p>
+            <a:r>
+              <a:rPr lang="en-US" altLang="zh-CN" dirty="0"/>
+              <a:t>Due to time constraints, the complete activity diagram will be shown in the final report.</a:t>
+            </a:r>
             <a:endParaRPr lang="zh-CN" altLang="en-US" dirty="0"/>
           </a:p>
         </p:txBody>
@@ -7343,8 +7714,8 @@
         </p:nvSpPr>
         <p:spPr>
           <a:xfrm>
-            <a:off x="4041633" y="1713389"/>
-            <a:ext cx="7763779" cy="2123658"/>
+            <a:off x="4083923" y="2524166"/>
+            <a:ext cx="7763779" cy="1446550"/>
           </a:xfrm>
           <a:prstGeom prst="rect">
             <a:avLst/>
@@ -7358,7 +7729,28 @@
           <a:p>
             <a:r>
               <a:rPr lang="en-US" altLang="zh-CN" sz="4400" dirty="0"/>
-              <a:t>Visualization of regional historical meteorological data results</a:t>
+              <a:t>Online takeaway ordering system</a:t>
+            </a:r>
+            <a:r>
+              <a:rPr lang="zh-CN" altLang="en-US" sz="4400" dirty="0"/>
+              <a:t>：</a:t>
+            </a:r>
+            <a:endParaRPr lang="en-US" altLang="zh-CN" sz="4400" dirty="0"/>
+          </a:p>
+          <a:p>
+            <a:r>
+              <a:rPr lang="en-US" altLang="zh-CN" sz="4400" b="1" kern="100" dirty="0">
+                <a:solidFill>
+                  <a:schemeClr val="tx1">
+                    <a:lumMod val="75000"/>
+                    <a:lumOff val="25000"/>
+                  </a:schemeClr>
+                </a:solidFill>
+                <a:latin typeface="微软雅黑" panose="020B0503020204020204" pitchFamily="34" charset="-122"/>
+                <a:ea typeface="微软雅黑" panose="020B0503020204020204" pitchFamily="34" charset="-122"/>
+                <a:cs typeface="Times New Roman" panose="02020603050405020304" pitchFamily="18" charset="0"/>
+              </a:rPr>
+              <a:t>Tiger Takeaway</a:t>
             </a:r>
             <a:endParaRPr lang="zh-CN" altLang="zh-CN" sz="2800" b="1" kern="100" dirty="0">
               <a:solidFill>
@@ -7494,6 +7886,51 @@
           </a:p>
         </p:txBody>
       </p:sp>
+      <p:sp>
+        <p:nvSpPr>
+          <p:cNvPr id="2" name="矩形 1">
+            <a:extLst>
+              <a:ext uri="{FF2B5EF4-FFF2-40B4-BE49-F238E27FC236}">
+                <a16:creationId xmlns:a16="http://schemas.microsoft.com/office/drawing/2014/main" id="{4E11BDCD-A811-9628-6706-F3EFA1E7931D}"/>
+              </a:ext>
+            </a:extLst>
+          </p:cNvPr>
+          <p:cNvSpPr/>
+          <p:nvPr/>
+        </p:nvSpPr>
+        <p:spPr>
+          <a:xfrm>
+            <a:off x="4083922" y="1821230"/>
+            <a:ext cx="7763779" cy="584775"/>
+          </a:xfrm>
+          <a:prstGeom prst="rect">
+            <a:avLst/>
+          </a:prstGeom>
+        </p:spPr>
+        <p:txBody>
+          <a:bodyPr wrap="square">
+            <a:spAutoFit/>
+          </a:bodyPr>
+          <a:lstStyle/>
+          <a:p>
+            <a:r>
+              <a:rPr lang="en-US" altLang="zh-CN" sz="3200" dirty="0"/>
+              <a:t>CS5200 Database Management Systems</a:t>
+            </a:r>
+            <a:endParaRPr lang="zh-CN" altLang="zh-CN" b="1" kern="100" dirty="0">
+              <a:solidFill>
+                <a:schemeClr val="tx1">
+                  <a:lumMod val="75000"/>
+                  <a:lumOff val="25000"/>
+                </a:schemeClr>
+              </a:solidFill>
+              <a:latin typeface="微软雅黑" panose="020B0503020204020204" pitchFamily="34" charset="-122"/>
+              <a:ea typeface="微软雅黑" panose="020B0503020204020204" pitchFamily="34" charset="-122"/>
+              <a:cs typeface="Times New Roman" panose="02020603050405020304" pitchFamily="18" charset="0"/>
+            </a:endParaRPr>
+          </a:p>
+        </p:txBody>
+      </p:sp>
     </p:spTree>
     <p:extLst>
       <p:ext uri="{BB962C8B-B14F-4D97-AF65-F5344CB8AC3E}">
@@ -7504,260 +7941,6 @@
   <p:clrMapOvr>
     <a:masterClrMapping/>
   </p:clrMapOvr>
-  <mc:AlternateContent xmlns:mc="http://schemas.openxmlformats.org/markup-compatibility/2006" xmlns:p14="http://schemas.microsoft.com/office/powerpoint/2010/main">
-    <mc:Choice Requires="p14">
-      <p:timing>
-        <p:tnLst>
-          <p:par>
-            <p:cTn id="1" dur="indefinite" restart="never" nodeType="tmRoot">
-              <p:childTnLst>
-                <p:seq concurrent="1" nextAc="seek">
-                  <p:cTn id="2" dur="indefinite" nodeType="mainSeq">
-                    <p:childTnLst>
-                      <p:par>
-                        <p:cTn id="3" fill="hold">
-                          <p:stCondLst>
-                            <p:cond delay="indefinite"/>
-                          </p:stCondLst>
-                          <p:childTnLst>
-                            <p:par>
-                              <p:cTn id="4" fill="hold">
-                                <p:stCondLst>
-                                  <p:cond delay="0"/>
-                                </p:stCondLst>
-                                <p:childTnLst>
-                                  <p:par>
-                                    <p:cTn id="5" presetID="2" presetClass="entr" presetSubtype="4" fill="hold" grpId="0" nodeType="clickEffect" p14:presetBounceEnd="42000">
-                                      <p:stCondLst>
-                                        <p:cond delay="0"/>
-                                      </p:stCondLst>
-                                      <p:childTnLst>
-                                        <p:set>
-                                          <p:cBhvr>
-                                            <p:cTn id="6" dur="1" fill="hold">
-                                              <p:stCondLst>
-                                                <p:cond delay="0"/>
-                                              </p:stCondLst>
-                                            </p:cTn>
-                                            <p:tgtEl>
-                                              <p:spTgt spid="23"/>
-                                            </p:tgtEl>
-                                            <p:attrNameLst>
-                                              <p:attrName>style.visibility</p:attrName>
-                                            </p:attrNameLst>
-                                          </p:cBhvr>
-                                          <p:to>
-                                            <p:strVal val="visible"/>
-                                          </p:to>
-                                        </p:set>
-                                        <p:anim calcmode="lin" valueType="num" p14:bounceEnd="42000">
-                                          <p:cBhvr additive="base">
-                                            <p:cTn id="7" dur="500" fill="hold"/>
-                                            <p:tgtEl>
-                                              <p:spTgt spid="23"/>
-                                            </p:tgtEl>
-                                            <p:attrNameLst>
-                                              <p:attrName>ppt_x</p:attrName>
-                                            </p:attrNameLst>
-                                          </p:cBhvr>
-                                          <p:tavLst>
-                                            <p:tav tm="0">
-                                              <p:val>
-                                                <p:strVal val="#ppt_x"/>
-                                              </p:val>
-                                            </p:tav>
-                                            <p:tav tm="100000">
-                                              <p:val>
-                                                <p:strVal val="#ppt_x"/>
-                                              </p:val>
-                                            </p:tav>
-                                          </p:tavLst>
-                                        </p:anim>
-                                        <p:anim calcmode="lin" valueType="num" p14:bounceEnd="42000">
-                                          <p:cBhvr additive="base">
-                                            <p:cTn id="8" dur="500" fill="hold"/>
-                                            <p:tgtEl>
-                                              <p:spTgt spid="23"/>
-                                            </p:tgtEl>
-                                            <p:attrNameLst>
-                                              <p:attrName>ppt_y</p:attrName>
-                                            </p:attrNameLst>
-                                          </p:cBhvr>
-                                          <p:tavLst>
-                                            <p:tav tm="0">
-                                              <p:val>
-                                                <p:strVal val="1+#ppt_h/2"/>
-                                              </p:val>
-                                            </p:tav>
-                                            <p:tav tm="100000">
-                                              <p:val>
-                                                <p:strVal val="#ppt_y"/>
-                                              </p:val>
-                                            </p:tav>
-                                          </p:tavLst>
-                                        </p:anim>
-                                      </p:childTnLst>
-                                    </p:cTn>
-                                  </p:par>
-                                </p:childTnLst>
-                              </p:cTn>
-                            </p:par>
-                          </p:childTnLst>
-                        </p:cTn>
-                      </p:par>
-                    </p:childTnLst>
-                  </p:cTn>
-                  <p:prevCondLst>
-                    <p:cond evt="onPrev" delay="0">
-                      <p:tgtEl>
-                        <p:sldTgt/>
-                      </p:tgtEl>
-                    </p:cond>
-                  </p:prevCondLst>
-                  <p:nextCondLst>
-                    <p:cond evt="onNext" delay="0">
-                      <p:tgtEl>
-                        <p:sldTgt/>
-                      </p:tgtEl>
-                    </p:cond>
-                  </p:nextCondLst>
-                </p:seq>
-              </p:childTnLst>
-            </p:cTn>
-          </p:par>
-        </p:tnLst>
-        <p:bldLst>
-          <p:bldP spid="23" grpId="0"/>
-        </p:bldLst>
-      </p:timing>
-    </mc:Choice>
-    <mc:Fallback xmlns="">
-      <p:timing>
-        <p:tnLst>
-          <p:par>
-            <p:cTn id="1" dur="indefinite" restart="never" nodeType="tmRoot">
-              <p:childTnLst>
-                <p:seq concurrent="1" nextAc="seek">
-                  <p:cTn id="2" dur="indefinite" nodeType="mainSeq">
-                    <p:childTnLst>
-                      <p:par>
-                        <p:cTn id="3" fill="hold">
-                          <p:stCondLst>
-                            <p:cond delay="indefinite"/>
-                          </p:stCondLst>
-                          <p:childTnLst>
-                            <p:par>
-                              <p:cTn id="4" fill="hold">
-                                <p:stCondLst>
-                                  <p:cond delay="0"/>
-                                </p:stCondLst>
-                                <p:childTnLst>
-                                  <p:par>
-                                    <p:cTn id="5" presetID="2" presetClass="entr" presetSubtype="4" fill="hold" grpId="0" nodeType="clickEffect">
-                                      <p:stCondLst>
-                                        <p:cond delay="0"/>
-                                      </p:stCondLst>
-                                      <p:childTnLst>
-                                        <p:set>
-                                          <p:cBhvr>
-                                            <p:cTn id="6" dur="1" fill="hold">
-                                              <p:stCondLst>
-                                                <p:cond delay="0"/>
-                                              </p:stCondLst>
-                                            </p:cTn>
-                                            <p:tgtEl>
-                                              <p:spTgt spid="23"/>
-                                            </p:tgtEl>
-                                            <p:attrNameLst>
-                                              <p:attrName>style.visibility</p:attrName>
-                                            </p:attrNameLst>
-                                          </p:cBhvr>
-                                          <p:to>
-                                            <p:strVal val="visible"/>
-                                          </p:to>
-                                        </p:set>
-                                        <p:anim calcmode="lin" valueType="num">
-                                          <p:cBhvr additive="base">
-                                            <p:cTn id="7" dur="500" fill="hold"/>
-                                            <p:tgtEl>
-                                              <p:spTgt spid="23"/>
-                                            </p:tgtEl>
-                                            <p:attrNameLst>
-                                              <p:attrName>ppt_x</p:attrName>
-                                            </p:attrNameLst>
-                                          </p:cBhvr>
-                                          <p:tavLst>
-                                            <p:tav tm="0">
-                                              <p:val>
-                                                <p:strVal val="#ppt_x"/>
-                                              </p:val>
-                                            </p:tav>
-                                            <p:tav tm="100000">
-                                              <p:val>
-                                                <p:strVal val="#ppt_x"/>
-                                              </p:val>
-                                            </p:tav>
-                                          </p:tavLst>
-                                        </p:anim>
-                                        <p:anim calcmode="lin" valueType="num">
-                                          <p:cBhvr additive="base">
-                                            <p:cTn id="8" dur="500" fill="hold"/>
-                                            <p:tgtEl>
-                                              <p:spTgt spid="23"/>
-                                            </p:tgtEl>
-                                            <p:attrNameLst>
-                                              <p:attrName>ppt_y</p:attrName>
-                                            </p:attrNameLst>
-                                          </p:cBhvr>
-                                          <p:tavLst>
-                                            <p:tav tm="0">
-                                              <p:val>
-                                                <p:strVal val="1+#ppt_h/2"/>
-                                              </p:val>
-                                            </p:tav>
-                                            <p:tav tm="100000">
-                                              <p:val>
-                                                <p:strVal val="#ppt_y"/>
-                                              </p:val>
-                                            </p:tav>
-                                          </p:tavLst>
-                                        </p:anim>
-                                      </p:childTnLst>
-                                    </p:cTn>
-                                  </p:par>
-                                </p:childTnLst>
-                              </p:cTn>
-                            </p:par>
-                          </p:childTnLst>
-                        </p:cTn>
-                      </p:par>
-                    </p:childTnLst>
-                  </p:cTn>
-                  <p:prevCondLst>
-                    <p:cond evt="onPrev" delay="0">
-                      <p:tgtEl>
-                        <p:sldTgt/>
-                      </p:tgtEl>
-                    </p:cond>
-                  </p:prevCondLst>
-                  <p:nextCondLst>
-                    <p:cond evt="onNext" delay="0">
-                      <p:tgtEl>
-                        <p:sldTgt/>
-                      </p:tgtEl>
-                    </p:cond>
-                  </p:nextCondLst>
-                </p:seq>
-              </p:childTnLst>
-            </p:cTn>
-          </p:par>
-        </p:tnLst>
-        <p:bldLst>
-          <p:bldP spid="23" grpId="0"/>
-        </p:bldLst>
-      </p:timing>
-    </mc:Fallback>
-  </mc:AlternateContent>
 </p:sld>
 </file>
 
@@ -8868,8 +9051,8 @@
         </p:nvSpPr>
         <p:spPr>
           <a:xfrm>
-            <a:off x="2174449" y="862037"/>
-            <a:ext cx="2843117" cy="830997"/>
+            <a:off x="2078817" y="1328526"/>
+            <a:ext cx="2843117" cy="461665"/>
           </a:xfrm>
           <a:prstGeom prst="rect">
             <a:avLst/>
@@ -8893,9 +9076,41 @@
                 <a:ea typeface="微软雅黑" panose="020B0503020204020204" pitchFamily="34" charset="-122"/>
                 <a:cs typeface="Times New Roman" panose="02020603050405020304" pitchFamily="18" charset="0"/>
               </a:rPr>
-              <a:t>MOMODA </a:t>
+              <a:t>Business Flow</a:t>
             </a:r>
-          </a:p>
+            <a:endParaRPr lang="zh-CN" altLang="en-US" sz="2400" b="1" dirty="0">
+              <a:solidFill>
+                <a:schemeClr val="tx1">
+                  <a:lumMod val="75000"/>
+                  <a:lumOff val="25000"/>
+                </a:schemeClr>
+              </a:solidFill>
+              <a:latin typeface="微软雅黑" panose="020B0503020204020204" pitchFamily="34" charset="-122"/>
+              <a:ea typeface="微软雅黑" panose="020B0503020204020204" pitchFamily="34" charset="-122"/>
+            </a:endParaRPr>
+          </a:p>
+        </p:txBody>
+      </p:sp>
+      <p:sp>
+        <p:nvSpPr>
+          <p:cNvPr id="26" name="矩形 25"/>
+          <p:cNvSpPr/>
+          <p:nvPr/>
+        </p:nvSpPr>
+        <p:spPr>
+          <a:xfrm>
+            <a:off x="4120485" y="2636505"/>
+            <a:ext cx="2843117" cy="830997"/>
+          </a:xfrm>
+          <a:prstGeom prst="rect">
+            <a:avLst/>
+          </a:prstGeom>
+        </p:spPr>
+        <p:txBody>
+          <a:bodyPr wrap="square">
+            <a:spAutoFit/>
+          </a:bodyPr>
+          <a:lstStyle/>
           <a:p>
             <a:r>
               <a:rPr lang="en-US" altLang="zh-CN" sz="2400" b="1" dirty="0">
@@ -8909,7 +9124,7 @@
                 <a:ea typeface="微软雅黑" panose="020B0503020204020204" pitchFamily="34" charset="-122"/>
                 <a:cs typeface="Times New Roman" panose="02020603050405020304" pitchFamily="18" charset="0"/>
               </a:rPr>
-              <a:t>POWERPOINT</a:t>
+              <a:t>Specifications &amp; Architecture</a:t>
             </a:r>
             <a:endParaRPr lang="zh-CN" altLang="en-US" sz="2400" b="1" dirty="0">
               <a:solidFill>
@@ -8926,13 +9141,13 @@
       </p:sp>
       <p:sp>
         <p:nvSpPr>
-          <p:cNvPr id="26" name="矩形 25"/>
+          <p:cNvPr id="27" name="矩形 26"/>
           <p:cNvSpPr/>
           <p:nvPr/>
         </p:nvSpPr>
         <p:spPr>
           <a:xfrm>
-            <a:off x="4120485" y="2636505"/>
+            <a:off x="5304464" y="154780"/>
             <a:ext cx="2843117" cy="830997"/>
           </a:xfrm>
           <a:prstGeom prst="rect">
@@ -8945,6 +9160,7 @@
           </a:bodyPr>
           <a:lstStyle/>
           <a:p>
+            <a:pPr algn="ctr"/>
             <a:r>
               <a:rPr lang="en-US" altLang="zh-CN" sz="2400" b="1" dirty="0">
                 <a:solidFill>
@@ -8957,10 +9173,43 @@
                 <a:ea typeface="微软雅黑" panose="020B0503020204020204" pitchFamily="34" charset="-122"/>
                 <a:cs typeface="Times New Roman" panose="02020603050405020304" pitchFamily="18" charset="0"/>
               </a:rPr>
-              <a:t>MOMODA </a:t>
+              <a:t>Backstage introduction</a:t>
             </a:r>
-          </a:p>
-          <a:p>
+            <a:endParaRPr lang="zh-CN" altLang="en-US" sz="2400" b="1" dirty="0">
+              <a:solidFill>
+                <a:schemeClr val="tx1">
+                  <a:lumMod val="75000"/>
+                  <a:lumOff val="25000"/>
+                </a:schemeClr>
+              </a:solidFill>
+              <a:latin typeface="微软雅黑" panose="020B0503020204020204" pitchFamily="34" charset="-122"/>
+              <a:ea typeface="微软雅黑" panose="020B0503020204020204" pitchFamily="34" charset="-122"/>
+            </a:endParaRPr>
+          </a:p>
+        </p:txBody>
+      </p:sp>
+      <p:sp>
+        <p:nvSpPr>
+          <p:cNvPr id="28" name="矩形 27"/>
+          <p:cNvSpPr/>
+          <p:nvPr/>
+        </p:nvSpPr>
+        <p:spPr>
+          <a:xfrm>
+            <a:off x="7901043" y="3027269"/>
+            <a:ext cx="2843117" cy="830997"/>
+          </a:xfrm>
+          <a:prstGeom prst="rect">
+            <a:avLst/>
+          </a:prstGeom>
+        </p:spPr>
+        <p:txBody>
+          <a:bodyPr wrap="square">
+            <a:spAutoFit/>
+          </a:bodyPr>
+          <a:lstStyle/>
+          <a:p>
+            <a:pPr algn="ctr"/>
             <a:r>
               <a:rPr lang="en-US" altLang="zh-CN" sz="2400" b="1" dirty="0">
                 <a:solidFill>
@@ -8973,7 +9222,7 @@
                 <a:ea typeface="微软雅黑" panose="020B0503020204020204" pitchFamily="34" charset="-122"/>
                 <a:cs typeface="Times New Roman" panose="02020603050405020304" pitchFamily="18" charset="0"/>
               </a:rPr>
-              <a:t>POWERPOINT</a:t>
+              <a:t>Client introduction</a:t>
             </a:r>
             <a:endParaRPr lang="zh-CN" altLang="en-US" sz="2400" b="1" dirty="0">
               <a:solidFill>
@@ -8988,134 +9237,6 @@
           </a:p>
         </p:txBody>
       </p:sp>
-      <p:sp>
-        <p:nvSpPr>
-          <p:cNvPr id="27" name="矩形 26"/>
-          <p:cNvSpPr/>
-          <p:nvPr/>
-        </p:nvSpPr>
-        <p:spPr>
-          <a:xfrm>
-            <a:off x="7016379" y="406205"/>
-            <a:ext cx="2843117" cy="830997"/>
-          </a:xfrm>
-          <a:prstGeom prst="rect">
-            <a:avLst/>
-          </a:prstGeom>
-        </p:spPr>
-        <p:txBody>
-          <a:bodyPr wrap="square">
-            <a:spAutoFit/>
-          </a:bodyPr>
-          <a:lstStyle/>
-          <a:p>
-            <a:r>
-              <a:rPr lang="en-US" altLang="zh-CN" sz="2400" b="1" dirty="0">
-                <a:solidFill>
-                  <a:schemeClr val="tx1">
-                    <a:lumMod val="75000"/>
-                    <a:lumOff val="25000"/>
-                  </a:schemeClr>
-                </a:solidFill>
-                <a:latin typeface="微软雅黑" panose="020B0503020204020204" pitchFamily="34" charset="-122"/>
-                <a:ea typeface="微软雅黑" panose="020B0503020204020204" pitchFamily="34" charset="-122"/>
-                <a:cs typeface="Times New Roman" panose="02020603050405020304" pitchFamily="18" charset="0"/>
-              </a:rPr>
-              <a:t>MOMODA </a:t>
-            </a:r>
-          </a:p>
-          <a:p>
-            <a:r>
-              <a:rPr lang="en-US" altLang="zh-CN" sz="2400" b="1" dirty="0">
-                <a:solidFill>
-                  <a:schemeClr val="tx1">
-                    <a:lumMod val="75000"/>
-                    <a:lumOff val="25000"/>
-                  </a:schemeClr>
-                </a:solidFill>
-                <a:latin typeface="微软雅黑" panose="020B0503020204020204" pitchFamily="34" charset="-122"/>
-                <a:ea typeface="微软雅黑" panose="020B0503020204020204" pitchFamily="34" charset="-122"/>
-                <a:cs typeface="Times New Roman" panose="02020603050405020304" pitchFamily="18" charset="0"/>
-              </a:rPr>
-              <a:t>POWERPOINT</a:t>
-            </a:r>
-            <a:endParaRPr lang="zh-CN" altLang="en-US" sz="2400" b="1" dirty="0">
-              <a:solidFill>
-                <a:schemeClr val="tx1">
-                  <a:lumMod val="75000"/>
-                  <a:lumOff val="25000"/>
-                </a:schemeClr>
-              </a:solidFill>
-              <a:latin typeface="微软雅黑" panose="020B0503020204020204" pitchFamily="34" charset="-122"/>
-              <a:ea typeface="微软雅黑" panose="020B0503020204020204" pitchFamily="34" charset="-122"/>
-            </a:endParaRPr>
-          </a:p>
-        </p:txBody>
-      </p:sp>
-      <p:sp>
-        <p:nvSpPr>
-          <p:cNvPr id="28" name="矩形 27"/>
-          <p:cNvSpPr/>
-          <p:nvPr/>
-        </p:nvSpPr>
-        <p:spPr>
-          <a:xfrm>
-            <a:off x="7901043" y="3027269"/>
-            <a:ext cx="2843117" cy="830997"/>
-          </a:xfrm>
-          <a:prstGeom prst="rect">
-            <a:avLst/>
-          </a:prstGeom>
-        </p:spPr>
-        <p:txBody>
-          <a:bodyPr wrap="square">
-            <a:spAutoFit/>
-          </a:bodyPr>
-          <a:lstStyle/>
-          <a:p>
-            <a:r>
-              <a:rPr lang="en-US" altLang="zh-CN" sz="2400" b="1" dirty="0">
-                <a:solidFill>
-                  <a:schemeClr val="tx1">
-                    <a:lumMod val="75000"/>
-                    <a:lumOff val="25000"/>
-                  </a:schemeClr>
-                </a:solidFill>
-                <a:latin typeface="微软雅黑" panose="020B0503020204020204" pitchFamily="34" charset="-122"/>
-                <a:ea typeface="微软雅黑" panose="020B0503020204020204" pitchFamily="34" charset="-122"/>
-                <a:cs typeface="Times New Roman" panose="02020603050405020304" pitchFamily="18" charset="0"/>
-              </a:rPr>
-              <a:t>MOMODA </a:t>
-            </a:r>
-          </a:p>
-          <a:p>
-            <a:r>
-              <a:rPr lang="en-US" altLang="zh-CN" sz="2400" b="1" dirty="0">
-                <a:solidFill>
-                  <a:schemeClr val="tx1">
-                    <a:lumMod val="75000"/>
-                    <a:lumOff val="25000"/>
-                  </a:schemeClr>
-                </a:solidFill>
-                <a:latin typeface="微软雅黑" panose="020B0503020204020204" pitchFamily="34" charset="-122"/>
-                <a:ea typeface="微软雅黑" panose="020B0503020204020204" pitchFamily="34" charset="-122"/>
-                <a:cs typeface="Times New Roman" panose="02020603050405020304" pitchFamily="18" charset="0"/>
-              </a:rPr>
-              <a:t>POWERPOINT</a:t>
-            </a:r>
-            <a:endParaRPr lang="zh-CN" altLang="en-US" sz="2400" b="1" dirty="0">
-              <a:solidFill>
-                <a:schemeClr val="tx1">
-                  <a:lumMod val="75000"/>
-                  <a:lumOff val="25000"/>
-                </a:schemeClr>
-              </a:solidFill>
-              <a:latin typeface="微软雅黑" panose="020B0503020204020204" pitchFamily="34" charset="-122"/>
-              <a:ea typeface="微软雅黑" panose="020B0503020204020204" pitchFamily="34" charset="-122"/>
-            </a:endParaRPr>
-          </a:p>
-        </p:txBody>
-      </p:sp>
     </p:spTree>
     <p:extLst>
       <p:ext uri="{BB962C8B-B14F-4D97-AF65-F5344CB8AC3E}">
@@ -9126,8 +9247,8 @@
   <p:clrMapOvr>
     <a:masterClrMapping/>
   </p:clrMapOvr>
-  <mc:AlternateContent xmlns:mc="http://schemas.openxmlformats.org/markup-compatibility/2006" xmlns:p14="http://schemas.microsoft.com/office/powerpoint/2010/main">
-    <mc:Choice Requires="p14">
+  <mc:AlternateContent xmlns:mc="http://schemas.openxmlformats.org/markup-compatibility/2006">
+    <mc:Choice xmlns:p14="http://schemas.microsoft.com/office/powerpoint/2010/main" Requires="p14">
       <p:timing>
         <p:tnLst>
           <p:par>
@@ -9505,7 +9626,7 @@
         </p:bldLst>
       </p:timing>
     </mc:Choice>
-    <mc:Fallback xmlns="">
+    <mc:Fallback>
       <p:timing>
         <p:tnLst>
           <p:par>
@@ -14450,7 +14571,7 @@
             <a:avLst/>
           </a:prstGeom>
           <a:solidFill>
-            <a:schemeClr val="accent2"/>
+            <a:srgbClr val="5F9387"/>
           </a:solidFill>
           <a:ln>
             <a:noFill/>
@@ -15358,7 +15479,7 @@
             <a:avLst/>
           </a:prstGeom>
           <a:solidFill>
-            <a:schemeClr val="accent3"/>
+            <a:srgbClr val="F2C06B"/>
           </a:solidFill>
           <a:ln>
             <a:noFill/>
@@ -15426,7 +15547,7 @@
                 <a:ea typeface="微软雅黑" panose="020B0503020204020204" pitchFamily="34" charset="-122"/>
                 <a:cs typeface="Times New Roman" panose="02020603050405020304" pitchFamily="18" charset="0"/>
               </a:rPr>
-              <a:t>Project Demo</a:t>
+              <a:t>Introduction &amp; Demo</a:t>
             </a:r>
             <a:endParaRPr lang="zh-CN" altLang="en-US" sz="3200" b="1" dirty="0">
               <a:solidFill>
@@ -15451,266 +15572,6 @@
   <p:clrMapOvr>
     <a:masterClrMapping/>
   </p:clrMapOvr>
-  <mc:AlternateContent xmlns:mc="http://schemas.openxmlformats.org/markup-compatibility/2006" xmlns:p14="http://schemas.microsoft.com/office/powerpoint/2010/main">
-    <mc:Choice Requires="p14">
-      <p:timing>
-        <p:tnLst>
-          <p:par>
-            <p:cTn id="1" dur="indefinite" restart="never" nodeType="tmRoot">
-              <p:childTnLst>
-                <p:seq concurrent="1" nextAc="seek">
-                  <p:cTn id="2" dur="indefinite" nodeType="mainSeq">
-                    <p:childTnLst>
-                      <p:par>
-                        <p:cTn id="3" fill="hold">
-                          <p:stCondLst>
-                            <p:cond delay="indefinite"/>
-                            <p:cond evt="onBegin" delay="0">
-                              <p:tn val="2"/>
-                            </p:cond>
-                          </p:stCondLst>
-                          <p:childTnLst>
-                            <p:par>
-                              <p:cTn id="4" fill="hold">
-                                <p:stCondLst>
-                                  <p:cond delay="0"/>
-                                </p:stCondLst>
-                                <p:childTnLst>
-                                  <p:par>
-                                    <p:cTn id="5" presetID="2" presetClass="entr" presetSubtype="2" fill="hold" grpId="0" nodeType="afterEffect" p14:presetBounceEnd="36000">
-                                      <p:stCondLst>
-                                        <p:cond delay="0"/>
-                                      </p:stCondLst>
-                                      <p:childTnLst>
-                                        <p:set>
-                                          <p:cBhvr>
-                                            <p:cTn id="6" dur="1" fill="hold">
-                                              <p:stCondLst>
-                                                <p:cond delay="0"/>
-                                              </p:stCondLst>
-                                            </p:cTn>
-                                            <p:tgtEl>
-                                              <p:spTgt spid="24"/>
-                                            </p:tgtEl>
-                                            <p:attrNameLst>
-                                              <p:attrName>style.visibility</p:attrName>
-                                            </p:attrNameLst>
-                                          </p:cBhvr>
-                                          <p:to>
-                                            <p:strVal val="visible"/>
-                                          </p:to>
-                                        </p:set>
-                                        <p:anim calcmode="lin" valueType="num" p14:bounceEnd="36000">
-                                          <p:cBhvr additive="base">
-                                            <p:cTn id="7" dur="500" fill="hold"/>
-                                            <p:tgtEl>
-                                              <p:spTgt spid="24"/>
-                                            </p:tgtEl>
-                                            <p:attrNameLst>
-                                              <p:attrName>ppt_x</p:attrName>
-                                            </p:attrNameLst>
-                                          </p:cBhvr>
-                                          <p:tavLst>
-                                            <p:tav tm="0">
-                                              <p:val>
-                                                <p:strVal val="1+#ppt_w/2"/>
-                                              </p:val>
-                                            </p:tav>
-                                            <p:tav tm="100000">
-                                              <p:val>
-                                                <p:strVal val="#ppt_x"/>
-                                              </p:val>
-                                            </p:tav>
-                                          </p:tavLst>
-                                        </p:anim>
-                                        <p:anim calcmode="lin" valueType="num" p14:bounceEnd="36000">
-                                          <p:cBhvr additive="base">
-                                            <p:cTn id="8" dur="500" fill="hold"/>
-                                            <p:tgtEl>
-                                              <p:spTgt spid="24"/>
-                                            </p:tgtEl>
-                                            <p:attrNameLst>
-                                              <p:attrName>ppt_y</p:attrName>
-                                            </p:attrNameLst>
-                                          </p:cBhvr>
-                                          <p:tavLst>
-                                            <p:tav tm="0">
-                                              <p:val>
-                                                <p:strVal val="#ppt_y"/>
-                                              </p:val>
-                                            </p:tav>
-                                            <p:tav tm="100000">
-                                              <p:val>
-                                                <p:strVal val="#ppt_y"/>
-                                              </p:val>
-                                            </p:tav>
-                                          </p:tavLst>
-                                        </p:anim>
-                                      </p:childTnLst>
-                                    </p:cTn>
-                                  </p:par>
-                                </p:childTnLst>
-                              </p:cTn>
-                            </p:par>
-                          </p:childTnLst>
-                        </p:cTn>
-                      </p:par>
-                    </p:childTnLst>
-                  </p:cTn>
-                  <p:prevCondLst>
-                    <p:cond evt="onPrev" delay="0">
-                      <p:tgtEl>
-                        <p:sldTgt/>
-                      </p:tgtEl>
-                    </p:cond>
-                  </p:prevCondLst>
-                  <p:nextCondLst>
-                    <p:cond evt="onNext" delay="0">
-                      <p:tgtEl>
-                        <p:sldTgt/>
-                      </p:tgtEl>
-                    </p:cond>
-                  </p:nextCondLst>
-                </p:seq>
-              </p:childTnLst>
-            </p:cTn>
-          </p:par>
-        </p:tnLst>
-        <p:bldLst>
-          <p:bldP spid="24" grpId="0"/>
-        </p:bldLst>
-      </p:timing>
-    </mc:Choice>
-    <mc:Fallback xmlns="">
-      <p:timing>
-        <p:tnLst>
-          <p:par>
-            <p:cTn id="1" dur="indefinite" restart="never" nodeType="tmRoot">
-              <p:childTnLst>
-                <p:seq concurrent="1" nextAc="seek">
-                  <p:cTn id="2" dur="indefinite" nodeType="mainSeq">
-                    <p:childTnLst>
-                      <p:par>
-                        <p:cTn id="3" fill="hold">
-                          <p:stCondLst>
-                            <p:cond delay="indefinite"/>
-                            <p:cond evt="onBegin" delay="0">
-                              <p:tn val="2"/>
-                            </p:cond>
-                          </p:stCondLst>
-                          <p:childTnLst>
-                            <p:par>
-                              <p:cTn id="4" fill="hold">
-                                <p:stCondLst>
-                                  <p:cond delay="0"/>
-                                </p:stCondLst>
-                                <p:childTnLst>
-                                  <p:par>
-                                    <p:cTn id="5" presetID="2" presetClass="entr" presetSubtype="2" fill="hold" grpId="0" nodeType="afterEffect">
-                                      <p:stCondLst>
-                                        <p:cond delay="0"/>
-                                      </p:stCondLst>
-                                      <p:childTnLst>
-                                        <p:set>
-                                          <p:cBhvr>
-                                            <p:cTn id="6" dur="1" fill="hold">
-                                              <p:stCondLst>
-                                                <p:cond delay="0"/>
-                                              </p:stCondLst>
-                                            </p:cTn>
-                                            <p:tgtEl>
-                                              <p:spTgt spid="24"/>
-                                            </p:tgtEl>
-                                            <p:attrNameLst>
-                                              <p:attrName>style.visibility</p:attrName>
-                                            </p:attrNameLst>
-                                          </p:cBhvr>
-                                          <p:to>
-                                            <p:strVal val="visible"/>
-                                          </p:to>
-                                        </p:set>
-                                        <p:anim calcmode="lin" valueType="num">
-                                          <p:cBhvr additive="base">
-                                            <p:cTn id="7" dur="500" fill="hold"/>
-                                            <p:tgtEl>
-                                              <p:spTgt spid="24"/>
-                                            </p:tgtEl>
-                                            <p:attrNameLst>
-                                              <p:attrName>ppt_x</p:attrName>
-                                            </p:attrNameLst>
-                                          </p:cBhvr>
-                                          <p:tavLst>
-                                            <p:tav tm="0">
-                                              <p:val>
-                                                <p:strVal val="1+#ppt_w/2"/>
-                                              </p:val>
-                                            </p:tav>
-                                            <p:tav tm="100000">
-                                              <p:val>
-                                                <p:strVal val="#ppt_x"/>
-                                              </p:val>
-                                            </p:tav>
-                                          </p:tavLst>
-                                        </p:anim>
-                                        <p:anim calcmode="lin" valueType="num">
-                                          <p:cBhvr additive="base">
-                                            <p:cTn id="8" dur="500" fill="hold"/>
-                                            <p:tgtEl>
-                                              <p:spTgt spid="24"/>
-                                            </p:tgtEl>
-                                            <p:attrNameLst>
-                                              <p:attrName>ppt_y</p:attrName>
-                                            </p:attrNameLst>
-                                          </p:cBhvr>
-                                          <p:tavLst>
-                                            <p:tav tm="0">
-                                              <p:val>
-                                                <p:strVal val="#ppt_y"/>
-                                              </p:val>
-                                            </p:tav>
-                                            <p:tav tm="100000">
-                                              <p:val>
-                                                <p:strVal val="#ppt_y"/>
-                                              </p:val>
-                                            </p:tav>
-                                          </p:tavLst>
-                                        </p:anim>
-                                      </p:childTnLst>
-                                    </p:cTn>
-                                  </p:par>
-                                </p:childTnLst>
-                              </p:cTn>
-                            </p:par>
-                          </p:childTnLst>
-                        </p:cTn>
-                      </p:par>
-                    </p:childTnLst>
-                  </p:cTn>
-                  <p:prevCondLst>
-                    <p:cond evt="onPrev" delay="0">
-                      <p:tgtEl>
-                        <p:sldTgt/>
-                      </p:tgtEl>
-                    </p:cond>
-                  </p:prevCondLst>
-                  <p:nextCondLst>
-                    <p:cond evt="onNext" delay="0">
-                      <p:tgtEl>
-                        <p:sldTgt/>
-                      </p:tgtEl>
-                    </p:cond>
-                  </p:nextCondLst>
-                </p:seq>
-              </p:childTnLst>
-            </p:cTn>
-          </p:par>
-        </p:tnLst>
-        <p:bldLst>
-          <p:bldP spid="24" grpId="0"/>
-        </p:bldLst>
-      </p:timing>
-    </mc:Fallback>
-  </mc:AlternateContent>
 </p:sld>
 </file>
 

</xml_diff>